<commit_message>
slides and report revisions w2
</commit_message>
<xml_diff>
--- a/Documentation/Weekly Report/week2/CMSC-4920-Group2-Week2.pptx
+++ b/Documentation/Weekly Report/week2/CMSC-4920-Group2-Week2.pptx
@@ -9,6 +9,7 @@
     <p:sldId id="257" r:id="rId3"/>
     <p:sldId id="258" r:id="rId4"/>
     <p:sldId id="259" r:id="rId5"/>
+    <p:sldId id="260" r:id="rId6"/>
   </p:sldIdLst>
   <p:sldSz cx="12192000" cy="6858000"/>
   <p:notesSz cx="6858000" cy="9144000"/>
@@ -107,13 +108,18 @@
       </a:defRPr>
     </a:lvl9pPr>
   </p:defaultTextStyle>
+  <p:extLst>
+    <p:ext uri="{EFAFB233-063F-42B5-8137-9DF3F51BA10A}">
+      <p15:sldGuideLst xmlns:p15="http://schemas.microsoft.com/office/powerpoint/2012/main"/>
+    </p:ext>
+  </p:extLst>
 </p:presentation>
 </file>
 
 <file path=ppt/revisionInfo.xml><?xml version="1.0" encoding="utf-8"?>
 <p1510:revInfo xmlns:a="http://schemas.openxmlformats.org/drawingml/2006/main" xmlns:r="http://schemas.openxmlformats.org/officeDocument/2006/relationships" xmlns:p1510="http://schemas.microsoft.com/office/powerpoint/2015/10/main">
   <p1510:revLst>
-    <p1510:client id="{24C3BB9E-A21F-49EE-A1A5-74993F831EE7}" v="11" dt="2026-01-22T19:50:42.969"/>
+    <p1510:client id="{24C3BB9E-A21F-49EE-A1A5-74993F831EE7}" v="18" dt="2026-01-23T14:40:04.520"/>
   </p1510:revLst>
 </p1510:revInfo>
 </file>
@@ -123,7 +129,7 @@
   <pc:docChgLst>
     <pc:chgData name="Margo Bonal" userId="18c9fa0f-b53d-478b-9dc0-6ad88786c19f" providerId="ADAL" clId="{93D479E5-F67F-4B8A-A78F-A0B574A116B6}"/>
     <pc:docChg chg="undo custSel addSld modSld">
-      <pc:chgData name="Margo Bonal" userId="18c9fa0f-b53d-478b-9dc0-6ad88786c19f" providerId="ADAL" clId="{93D479E5-F67F-4B8A-A78F-A0B574A116B6}" dt="2026-01-22T19:55:18.123" v="644" actId="1076"/>
+      <pc:chgData name="Margo Bonal" userId="18c9fa0f-b53d-478b-9dc0-6ad88786c19f" providerId="ADAL" clId="{93D479E5-F67F-4B8A-A78F-A0B574A116B6}" dt="2026-01-23T14:41:10.976" v="829" actId="207"/>
       <pc:docMkLst>
         <pc:docMk/>
       </pc:docMkLst>
@@ -239,7 +245,7 @@
         </pc:cxnChg>
       </pc:sldChg>
       <pc:sldChg chg="addSp delSp modSp new mod setBg">
-        <pc:chgData name="Margo Bonal" userId="18c9fa0f-b53d-478b-9dc0-6ad88786c19f" providerId="ADAL" clId="{93D479E5-F67F-4B8A-A78F-A0B574A116B6}" dt="2026-01-22T19:42:05.226" v="577" actId="313"/>
+        <pc:chgData name="Margo Bonal" userId="18c9fa0f-b53d-478b-9dc0-6ad88786c19f" providerId="ADAL" clId="{93D479E5-F67F-4B8A-A78F-A0B574A116B6}" dt="2026-01-23T14:29:37.986" v="725" actId="207"/>
         <pc:sldMkLst>
           <pc:docMk/>
           <pc:sldMk cId="850630602" sldId="257"/>
@@ -253,7 +259,7 @@
           </ac:spMkLst>
         </pc:spChg>
         <pc:spChg chg="mod">
-          <ac:chgData name="Margo Bonal" userId="18c9fa0f-b53d-478b-9dc0-6ad88786c19f" providerId="ADAL" clId="{93D479E5-F67F-4B8A-A78F-A0B574A116B6}" dt="2026-01-22T19:42:05.226" v="577" actId="313"/>
+          <ac:chgData name="Margo Bonal" userId="18c9fa0f-b53d-478b-9dc0-6ad88786c19f" providerId="ADAL" clId="{93D479E5-F67F-4B8A-A78F-A0B574A116B6}" dt="2026-01-23T14:29:37.986" v="725" actId="207"/>
           <ac:spMkLst>
             <pc:docMk/>
             <pc:sldMk cId="850630602" sldId="257"/>
@@ -390,7 +396,7 @@
         </pc:cxnChg>
       </pc:sldChg>
       <pc:sldChg chg="addSp delSp modSp new mod setBg">
-        <pc:chgData name="Margo Bonal" userId="18c9fa0f-b53d-478b-9dc0-6ad88786c19f" providerId="ADAL" clId="{93D479E5-F67F-4B8A-A78F-A0B574A116B6}" dt="2026-01-22T19:52:28.653" v="637" actId="1076"/>
+        <pc:chgData name="Margo Bonal" userId="18c9fa0f-b53d-478b-9dc0-6ad88786c19f" providerId="ADAL" clId="{93D479E5-F67F-4B8A-A78F-A0B574A116B6}" dt="2026-01-23T14:31:47.782" v="798" actId="20577"/>
         <pc:sldMkLst>
           <pc:docMk/>
           <pc:sldMk cId="2065992260" sldId="258"/>
@@ -404,7 +410,7 @@
           </ac:spMkLst>
         </pc:spChg>
         <pc:spChg chg="mod">
-          <ac:chgData name="Margo Bonal" userId="18c9fa0f-b53d-478b-9dc0-6ad88786c19f" providerId="ADAL" clId="{93D479E5-F67F-4B8A-A78F-A0B574A116B6}" dt="2026-01-22T19:50:16.936" v="618" actId="1076"/>
+          <ac:chgData name="Margo Bonal" userId="18c9fa0f-b53d-478b-9dc0-6ad88786c19f" providerId="ADAL" clId="{93D479E5-F67F-4B8A-A78F-A0B574A116B6}" dt="2026-01-23T14:31:47.782" v="798" actId="20577"/>
           <ac:spMkLst>
             <pc:docMk/>
             <pc:sldMk cId="2065992260" sldId="258"/>
@@ -412,7 +418,7 @@
           </ac:spMkLst>
         </pc:spChg>
         <pc:spChg chg="add mod">
-          <ac:chgData name="Margo Bonal" userId="18c9fa0f-b53d-478b-9dc0-6ad88786c19f" providerId="ADAL" clId="{93D479E5-F67F-4B8A-A78F-A0B574A116B6}" dt="2026-01-22T19:52:20.053" v="635" actId="1076"/>
+          <ac:chgData name="Margo Bonal" userId="18c9fa0f-b53d-478b-9dc0-6ad88786c19f" providerId="ADAL" clId="{93D479E5-F67F-4B8A-A78F-A0B574A116B6}" dt="2026-01-23T14:29:11.841" v="722" actId="20577"/>
           <ac:spMkLst>
             <pc:docMk/>
             <pc:sldMk cId="2065992260" sldId="258"/>
@@ -548,14 +554,14 @@
           </ac:grpSpMkLst>
         </pc:grpChg>
       </pc:sldChg>
-      <pc:sldChg chg="addSp modSp new mod setBg">
-        <pc:chgData name="Margo Bonal" userId="18c9fa0f-b53d-478b-9dc0-6ad88786c19f" providerId="ADAL" clId="{93D479E5-F67F-4B8A-A78F-A0B574A116B6}" dt="2026-01-22T19:55:18.123" v="644" actId="1076"/>
+      <pc:sldChg chg="addSp delSp modSp new mod setBg">
+        <pc:chgData name="Margo Bonal" userId="18c9fa0f-b53d-478b-9dc0-6ad88786c19f" providerId="ADAL" clId="{93D479E5-F67F-4B8A-A78F-A0B574A116B6}" dt="2026-01-23T14:39:22.112" v="812" actId="14100"/>
         <pc:sldMkLst>
           <pc:docMk/>
           <pc:sldMk cId="3713997872" sldId="259"/>
         </pc:sldMkLst>
         <pc:spChg chg="mod">
-          <ac:chgData name="Margo Bonal" userId="18c9fa0f-b53d-478b-9dc0-6ad88786c19f" providerId="ADAL" clId="{93D479E5-F67F-4B8A-A78F-A0B574A116B6}" dt="2026-01-22T19:55:14.906" v="643" actId="14100"/>
+          <ac:chgData name="Margo Bonal" userId="18c9fa0f-b53d-478b-9dc0-6ad88786c19f" providerId="ADAL" clId="{93D479E5-F67F-4B8A-A78F-A0B574A116B6}" dt="2026-01-23T14:39:17.742" v="811" actId="26606"/>
           <ac:spMkLst>
             <pc:docMk/>
             <pc:sldMk cId="3713997872" sldId="259"/>
@@ -563,53 +569,164 @@
           </ac:spMkLst>
         </pc:spChg>
         <pc:spChg chg="mod">
-          <ac:chgData name="Margo Bonal" userId="18c9fa0f-b53d-478b-9dc0-6ad88786c19f" providerId="ADAL" clId="{93D479E5-F67F-4B8A-A78F-A0B574A116B6}" dt="2026-01-22T19:55:18.123" v="644" actId="1076"/>
+          <ac:chgData name="Margo Bonal" userId="18c9fa0f-b53d-478b-9dc0-6ad88786c19f" providerId="ADAL" clId="{93D479E5-F67F-4B8A-A78F-A0B574A116B6}" dt="2026-01-23T14:39:17.742" v="811" actId="26606"/>
           <ac:spMkLst>
             <pc:docMk/>
             <pc:sldMk cId="3713997872" sldId="259"/>
             <ac:spMk id="3" creationId="{C605E30C-3490-D1E3-740D-40AD5E393958}"/>
           </ac:spMkLst>
         </pc:spChg>
-        <pc:spChg chg="add">
-          <ac:chgData name="Margo Bonal" userId="18c9fa0f-b53d-478b-9dc0-6ad88786c19f" providerId="ADAL" clId="{93D479E5-F67F-4B8A-A78F-A0B574A116B6}" dt="2026-01-22T19:54:57.743" v="638" actId="26606"/>
+        <pc:spChg chg="add mod">
+          <ac:chgData name="Margo Bonal" userId="18c9fa0f-b53d-478b-9dc0-6ad88786c19f" providerId="ADAL" clId="{93D479E5-F67F-4B8A-A78F-A0B574A116B6}" dt="2026-01-23T14:38:12.214" v="801" actId="14100"/>
+          <ac:spMkLst>
+            <pc:docMk/>
+            <pc:sldMk cId="3713997872" sldId="259"/>
+            <ac:spMk id="4" creationId="{71A0CB73-82AF-B604-51C2-A420C6D1D575}"/>
+          </ac:spMkLst>
+        </pc:spChg>
+        <pc:spChg chg="add del">
+          <ac:chgData name="Margo Bonal" userId="18c9fa0f-b53d-478b-9dc0-6ad88786c19f" providerId="ADAL" clId="{93D479E5-F67F-4B8A-A78F-A0B574A116B6}" dt="2026-01-23T14:38:42.157" v="804" actId="26606"/>
           <ac:spMkLst>
             <pc:docMk/>
             <pc:sldMk cId="3713997872" sldId="259"/>
             <ac:spMk id="8" creationId="{A7895A40-19A4-42D6-9D30-DBC1E8002635}"/>
           </ac:spMkLst>
         </pc:spChg>
-        <pc:spChg chg="add">
-          <ac:chgData name="Margo Bonal" userId="18c9fa0f-b53d-478b-9dc0-6ad88786c19f" providerId="ADAL" clId="{93D479E5-F67F-4B8A-A78F-A0B574A116B6}" dt="2026-01-22T19:54:57.743" v="638" actId="26606"/>
+        <pc:spChg chg="add del">
+          <ac:chgData name="Margo Bonal" userId="18c9fa0f-b53d-478b-9dc0-6ad88786c19f" providerId="ADAL" clId="{93D479E5-F67F-4B8A-A78F-A0B574A116B6}" dt="2026-01-23T14:38:42.157" v="804" actId="26606"/>
           <ac:spMkLst>
             <pc:docMk/>
             <pc:sldMk cId="3713997872" sldId="259"/>
             <ac:spMk id="10" creationId="{02F429C4-ABC9-46FC-818A-B5429CDE4A96}"/>
           </ac:spMkLst>
         </pc:spChg>
-        <pc:spChg chg="add">
-          <ac:chgData name="Margo Bonal" userId="18c9fa0f-b53d-478b-9dc0-6ad88786c19f" providerId="ADAL" clId="{93D479E5-F67F-4B8A-A78F-A0B574A116B6}" dt="2026-01-22T19:54:57.743" v="638" actId="26606"/>
+        <pc:spChg chg="add del">
+          <ac:chgData name="Margo Bonal" userId="18c9fa0f-b53d-478b-9dc0-6ad88786c19f" providerId="ADAL" clId="{93D479E5-F67F-4B8A-A78F-A0B574A116B6}" dt="2026-01-23T14:38:42.157" v="804" actId="26606"/>
           <ac:spMkLst>
             <pc:docMk/>
             <pc:sldMk cId="3713997872" sldId="259"/>
             <ac:spMk id="12" creationId="{2CEF98E4-3709-4952-8F42-2305CCE34FA3}"/>
           </ac:spMkLst>
         </pc:spChg>
-        <pc:spChg chg="add">
-          <ac:chgData name="Margo Bonal" userId="18c9fa0f-b53d-478b-9dc0-6ad88786c19f" providerId="ADAL" clId="{93D479E5-F67F-4B8A-A78F-A0B574A116B6}" dt="2026-01-22T19:54:57.743" v="638" actId="26606"/>
+        <pc:spChg chg="add del">
+          <ac:chgData name="Margo Bonal" userId="18c9fa0f-b53d-478b-9dc0-6ad88786c19f" providerId="ADAL" clId="{93D479E5-F67F-4B8A-A78F-A0B574A116B6}" dt="2026-01-23T14:38:42.157" v="804" actId="26606"/>
           <ac:spMkLst>
             <pc:docMk/>
             <pc:sldMk cId="3713997872" sldId="259"/>
             <ac:spMk id="14" creationId="{F10BCCF5-D685-47FF-B675-647EAEB72C8E}"/>
           </ac:spMkLst>
         </pc:spChg>
-        <pc:spChg chg="add">
-          <ac:chgData name="Margo Bonal" userId="18c9fa0f-b53d-478b-9dc0-6ad88786c19f" providerId="ADAL" clId="{93D479E5-F67F-4B8A-A78F-A0B574A116B6}" dt="2026-01-22T19:54:57.743" v="638" actId="26606"/>
+        <pc:spChg chg="add del">
+          <ac:chgData name="Margo Bonal" userId="18c9fa0f-b53d-478b-9dc0-6ad88786c19f" providerId="ADAL" clId="{93D479E5-F67F-4B8A-A78F-A0B574A116B6}" dt="2026-01-23T14:38:42.157" v="804" actId="26606"/>
           <ac:spMkLst>
             <pc:docMk/>
             <pc:sldMk cId="3713997872" sldId="259"/>
             <ac:spMk id="16" creationId="{B0EE8A42-107A-4D4C-8D56-BBAE95C7FC0D}"/>
           </ac:spMkLst>
         </pc:spChg>
+        <pc:spChg chg="add del">
+          <ac:chgData name="Margo Bonal" userId="18c9fa0f-b53d-478b-9dc0-6ad88786c19f" providerId="ADAL" clId="{93D479E5-F67F-4B8A-A78F-A0B574A116B6}" dt="2026-01-23T14:39:17.742" v="811" actId="26606"/>
+          <ac:spMkLst>
+            <pc:docMk/>
+            <pc:sldMk cId="3713997872" sldId="259"/>
+            <ac:spMk id="21" creationId="{BCED4D40-4B67-4331-AC48-79B82B4A47D8}"/>
+          </ac:spMkLst>
+        </pc:spChg>
+        <pc:spChg chg="add del">
+          <ac:chgData name="Margo Bonal" userId="18c9fa0f-b53d-478b-9dc0-6ad88786c19f" providerId="ADAL" clId="{93D479E5-F67F-4B8A-A78F-A0B574A116B6}" dt="2026-01-23T14:39:17.742" v="811" actId="26606"/>
+          <ac:spMkLst>
+            <pc:docMk/>
+            <pc:sldMk cId="3713997872" sldId="259"/>
+            <ac:spMk id="23" creationId="{670CEDEF-4F34-412E-84EE-329C1E936AF5}"/>
+          </ac:spMkLst>
+        </pc:spChg>
+        <pc:spChg chg="add">
+          <ac:chgData name="Margo Bonal" userId="18c9fa0f-b53d-478b-9dc0-6ad88786c19f" providerId="ADAL" clId="{93D479E5-F67F-4B8A-A78F-A0B574A116B6}" dt="2026-01-23T14:39:17.742" v="811" actId="26606"/>
+          <ac:spMkLst>
+            <pc:docMk/>
+            <pc:sldMk cId="3713997872" sldId="259"/>
+            <ac:spMk id="28" creationId="{C1A1C5D3-C053-4EE9-BE1A-419B6E27CCAE}"/>
+          </ac:spMkLst>
+        </pc:spChg>
+        <pc:spChg chg="add">
+          <ac:chgData name="Margo Bonal" userId="18c9fa0f-b53d-478b-9dc0-6ad88786c19f" providerId="ADAL" clId="{93D479E5-F67F-4B8A-A78F-A0B574A116B6}" dt="2026-01-23T14:39:17.742" v="811" actId="26606"/>
+          <ac:spMkLst>
+            <pc:docMk/>
+            <pc:sldMk cId="3713997872" sldId="259"/>
+            <ac:spMk id="30" creationId="{A3473CF9-37EB-43E7-89EF-D2D1C53D1DAC}"/>
+          </ac:spMkLst>
+        </pc:spChg>
+        <pc:spChg chg="add">
+          <ac:chgData name="Margo Bonal" userId="18c9fa0f-b53d-478b-9dc0-6ad88786c19f" providerId="ADAL" clId="{93D479E5-F67F-4B8A-A78F-A0B574A116B6}" dt="2026-01-23T14:39:17.742" v="811" actId="26606"/>
+          <ac:spMkLst>
+            <pc:docMk/>
+            <pc:sldMk cId="3713997872" sldId="259"/>
+            <ac:spMk id="32" creationId="{586B4EF9-43BA-4655-A6FF-1D8E21574C95}"/>
+          </ac:spMkLst>
+        </pc:spChg>
+        <pc:picChg chg="add mod">
+          <ac:chgData name="Margo Bonal" userId="18c9fa0f-b53d-478b-9dc0-6ad88786c19f" providerId="ADAL" clId="{93D479E5-F67F-4B8A-A78F-A0B574A116B6}" dt="2026-01-23T14:39:22.112" v="812" actId="14100"/>
+          <ac:picMkLst>
+            <pc:docMk/>
+            <pc:sldMk cId="3713997872" sldId="259"/>
+            <ac:picMk id="5" creationId="{62C793AA-0814-47BD-AB3D-851D9ACB6DC1}"/>
+          </ac:picMkLst>
+        </pc:picChg>
+      </pc:sldChg>
+      <pc:sldChg chg="addSp delSp modSp new mod setBg">
+        <pc:chgData name="Margo Bonal" userId="18c9fa0f-b53d-478b-9dc0-6ad88786c19f" providerId="ADAL" clId="{93D479E5-F67F-4B8A-A78F-A0B574A116B6}" dt="2026-01-23T14:41:10.976" v="829" actId="207"/>
+        <pc:sldMkLst>
+          <pc:docMk/>
+          <pc:sldMk cId="3921983173" sldId="260"/>
+        </pc:sldMkLst>
+        <pc:spChg chg="mod">
+          <ac:chgData name="Margo Bonal" userId="18c9fa0f-b53d-478b-9dc0-6ad88786c19f" providerId="ADAL" clId="{93D479E5-F67F-4B8A-A78F-A0B574A116B6}" dt="2026-01-23T14:41:10.976" v="829" actId="207"/>
+          <ac:spMkLst>
+            <pc:docMk/>
+            <pc:sldMk cId="3921983173" sldId="260"/>
+            <ac:spMk id="2" creationId="{9C9AD6B9-1CEE-7976-0BB7-22F5E9535735}"/>
+          </ac:spMkLst>
+        </pc:spChg>
+        <pc:spChg chg="del">
+          <ac:chgData name="Margo Bonal" userId="18c9fa0f-b53d-478b-9dc0-6ad88786c19f" providerId="ADAL" clId="{93D479E5-F67F-4B8A-A78F-A0B574A116B6}" dt="2026-01-23T14:40:23.478" v="826" actId="21"/>
+          <ac:spMkLst>
+            <pc:docMk/>
+            <pc:sldMk cId="3921983173" sldId="260"/>
+            <ac:spMk id="3" creationId="{3836BCF6-6752-A157-1823-548027C1CC11}"/>
+          </ac:spMkLst>
+        </pc:spChg>
+        <pc:spChg chg="add">
+          <ac:chgData name="Margo Bonal" userId="18c9fa0f-b53d-478b-9dc0-6ad88786c19f" providerId="ADAL" clId="{93D479E5-F67F-4B8A-A78F-A0B574A116B6}" dt="2026-01-23T14:40:32.079" v="827" actId="26606"/>
+          <ac:spMkLst>
+            <pc:docMk/>
+            <pc:sldMk cId="3921983173" sldId="260"/>
+            <ac:spMk id="7" creationId="{9C7E0A2C-7C0A-4AAC-B3B0-6C12B2EBAE05}"/>
+          </ac:spMkLst>
+        </pc:spChg>
+        <pc:spChg chg="add">
+          <ac:chgData name="Margo Bonal" userId="18c9fa0f-b53d-478b-9dc0-6ad88786c19f" providerId="ADAL" clId="{93D479E5-F67F-4B8A-A78F-A0B574A116B6}" dt="2026-01-23T14:40:32.079" v="827" actId="26606"/>
+          <ac:spMkLst>
+            <pc:docMk/>
+            <pc:sldMk cId="3921983173" sldId="260"/>
+            <ac:spMk id="9" creationId="{5EB7D2A2-F448-44D4-938C-DC84CBCB3B1E}"/>
+          </ac:spMkLst>
+        </pc:spChg>
+        <pc:spChg chg="add">
+          <ac:chgData name="Margo Bonal" userId="18c9fa0f-b53d-478b-9dc0-6ad88786c19f" providerId="ADAL" clId="{93D479E5-F67F-4B8A-A78F-A0B574A116B6}" dt="2026-01-23T14:40:32.079" v="827" actId="26606"/>
+          <ac:spMkLst>
+            <pc:docMk/>
+            <pc:sldMk cId="3921983173" sldId="260"/>
+            <ac:spMk id="11" creationId="{871AEA07-1E14-44B4-8E55-64EF049CD66F}"/>
+          </ac:spMkLst>
+        </pc:spChg>
+        <pc:cxnChg chg="add">
+          <ac:chgData name="Margo Bonal" userId="18c9fa0f-b53d-478b-9dc0-6ad88786c19f" providerId="ADAL" clId="{93D479E5-F67F-4B8A-A78F-A0B574A116B6}" dt="2026-01-23T14:40:32.079" v="827" actId="26606"/>
+          <ac:cxnSpMkLst>
+            <pc:docMk/>
+            <pc:sldMk cId="3921983173" sldId="260"/>
+            <ac:cxnSpMk id="13" creationId="{F7C8EA93-3210-4C62-99E9-153C275E3A87}"/>
+          </ac:cxnSpMkLst>
+        </pc:cxnChg>
       </pc:sldChg>
     </pc:docChg>
   </pc:docChgLst>
@@ -763,7 +880,7 @@
           <a:p>
             <a:fld id="{C882E6FB-EB88-4936-BED9-9E37159958CA}" type="datetimeFigureOut">
               <a:rPr lang="en-US" smtClean="0"/>
-              <a:t>1/22/2026</a:t>
+              <a:t>1/23/2026</a:t>
             </a:fld>
             <a:endParaRPr lang="en-US"/>
           </a:p>
@@ -961,7 +1078,7 @@
           <a:p>
             <a:fld id="{C882E6FB-EB88-4936-BED9-9E37159958CA}" type="datetimeFigureOut">
               <a:rPr lang="en-US" smtClean="0"/>
-              <a:t>1/22/2026</a:t>
+              <a:t>1/23/2026</a:t>
             </a:fld>
             <a:endParaRPr lang="en-US"/>
           </a:p>
@@ -1169,7 +1286,7 @@
           <a:p>
             <a:fld id="{C882E6FB-EB88-4936-BED9-9E37159958CA}" type="datetimeFigureOut">
               <a:rPr lang="en-US" smtClean="0"/>
-              <a:t>1/22/2026</a:t>
+              <a:t>1/23/2026</a:t>
             </a:fld>
             <a:endParaRPr lang="en-US"/>
           </a:p>
@@ -1367,7 +1484,7 @@
           <a:p>
             <a:fld id="{C882E6FB-EB88-4936-BED9-9E37159958CA}" type="datetimeFigureOut">
               <a:rPr lang="en-US" smtClean="0"/>
-              <a:t>1/22/2026</a:t>
+              <a:t>1/23/2026</a:t>
             </a:fld>
             <a:endParaRPr lang="en-US"/>
           </a:p>
@@ -1642,7 +1759,7 @@
           <a:p>
             <a:fld id="{C882E6FB-EB88-4936-BED9-9E37159958CA}" type="datetimeFigureOut">
               <a:rPr lang="en-US" smtClean="0"/>
-              <a:t>1/22/2026</a:t>
+              <a:t>1/23/2026</a:t>
             </a:fld>
             <a:endParaRPr lang="en-US"/>
           </a:p>
@@ -1907,7 +2024,7 @@
           <a:p>
             <a:fld id="{C882E6FB-EB88-4936-BED9-9E37159958CA}" type="datetimeFigureOut">
               <a:rPr lang="en-US" smtClean="0"/>
-              <a:t>1/22/2026</a:t>
+              <a:t>1/23/2026</a:t>
             </a:fld>
             <a:endParaRPr lang="en-US"/>
           </a:p>
@@ -2319,7 +2436,7 @@
           <a:p>
             <a:fld id="{C882E6FB-EB88-4936-BED9-9E37159958CA}" type="datetimeFigureOut">
               <a:rPr lang="en-US" smtClean="0"/>
-              <a:t>1/22/2026</a:t>
+              <a:t>1/23/2026</a:t>
             </a:fld>
             <a:endParaRPr lang="en-US"/>
           </a:p>
@@ -2460,7 +2577,7 @@
           <a:p>
             <a:fld id="{C882E6FB-EB88-4936-BED9-9E37159958CA}" type="datetimeFigureOut">
               <a:rPr lang="en-US" smtClean="0"/>
-              <a:t>1/22/2026</a:t>
+              <a:t>1/23/2026</a:t>
             </a:fld>
             <a:endParaRPr lang="en-US"/>
           </a:p>
@@ -2573,7 +2690,7 @@
           <a:p>
             <a:fld id="{C882E6FB-EB88-4936-BED9-9E37159958CA}" type="datetimeFigureOut">
               <a:rPr lang="en-US" smtClean="0"/>
-              <a:t>1/22/2026</a:t>
+              <a:t>1/23/2026</a:t>
             </a:fld>
             <a:endParaRPr lang="en-US"/>
           </a:p>
@@ -2884,7 +3001,7 @@
           <a:p>
             <a:fld id="{C882E6FB-EB88-4936-BED9-9E37159958CA}" type="datetimeFigureOut">
               <a:rPr lang="en-US" smtClean="0"/>
-              <a:t>1/22/2026</a:t>
+              <a:t>1/23/2026</a:t>
             </a:fld>
             <a:endParaRPr lang="en-US"/>
           </a:p>
@@ -3172,7 +3289,7 @@
           <a:p>
             <a:fld id="{C882E6FB-EB88-4936-BED9-9E37159958CA}" type="datetimeFigureOut">
               <a:rPr lang="en-US" smtClean="0"/>
-              <a:t>1/22/2026</a:t>
+              <a:t>1/23/2026</a:t>
             </a:fld>
             <a:endParaRPr lang="en-US"/>
           </a:p>
@@ -3413,7 +3530,7 @@
           <a:p>
             <a:fld id="{C882E6FB-EB88-4936-BED9-9E37159958CA}" type="datetimeFigureOut">
               <a:rPr lang="en-US" smtClean="0"/>
-              <a:t>1/22/2026</a:t>
+              <a:t>1/23/2026</a:t>
             </a:fld>
             <a:endParaRPr lang="en-US"/>
           </a:p>
@@ -4417,7 +4534,15 @@
           <a:p>
             <a:r>
               <a:rPr lang="en-US" dirty="0"/>
-              <a:t>	The Vulcan Activity Tracker is an athletic app that allows for the logging/tracking of all campus athletics activities. In one combined platform, the Vulcan Activity Tracker aspires to meet student organization needs, social interaction, and exercise goal planning in a free accessible way.</a:t>
+              <a:t>	</a:t>
+            </a:r>
+            <a:r>
+              <a:rPr lang="en-US" dirty="0">
+                <a:solidFill>
+                  <a:schemeClr val="tx1"/>
+                </a:solidFill>
+              </a:rPr>
+              <a:t>The Vulcan Activity Tracker is an athletic app that allows for the logging/tracking of all campus athletics activities. In one combined platform, the Vulcan Activity Tracker aspires to meet student organization needs, social interaction, and exercise goal planning in a free accessible way.</a:t>
             </a:r>
           </a:p>
           <a:p>
@@ -4881,7 +5006,7 @@
                 <a:ea typeface="+mn-ea"/>
                 <a:cs typeface="+mn-cs"/>
               </a:rPr>
-              <a:t>Goal 1- welcome Page </a:t>
+              <a:t>Goal 1- Welcome Page </a:t>
             </a:r>
           </a:p>
           <a:p>
@@ -4894,7 +5019,7 @@
                 <a:ea typeface="+mn-ea"/>
                 <a:cs typeface="+mn-cs"/>
               </a:rPr>
-              <a:t>Goal 2- creation of docker container and MSSQL database</a:t>
+              <a:t>Goal 2- Creation of docker container and MSSQL database</a:t>
             </a:r>
           </a:p>
           <a:p>
@@ -4907,7 +5032,7 @@
                 <a:ea typeface="+mn-ea"/>
                 <a:cs typeface="+mn-cs"/>
               </a:rPr>
-              <a:t>Goal 3- User login portal/ create </a:t>
+              <a:t>Goal 3- User login portal/ create account</a:t>
             </a:r>
           </a:p>
           <a:p>
@@ -4930,7 +5055,7 @@
                   <a:schemeClr val="tx1"/>
                 </a:solidFill>
               </a:rPr>
-              <a:t>- Include pics here</a:t>
+              <a:t>- Prevents rainbow, parallel, and other attacks</a:t>
             </a:r>
             <a:endParaRPr lang="en-US" sz="1900" kern="1200" dirty="0">
               <a:solidFill>
@@ -5165,20 +5290,42 @@
           </a:lstStyle>
           <a:p>
             <a:r>
-              <a:rPr lang="en-US" sz="2000" dirty="0"/>
-              <a:t>Challenges:</a:t>
-            </a:r>
-          </a:p>
-          <a:p>
-            <a:r>
-              <a:rPr lang="en-US" sz="2000" dirty="0"/>
+              <a:rPr lang="en-US" sz="2000" dirty="0">
+                <a:solidFill>
+                  <a:schemeClr val="tx1"/>
+                </a:solidFill>
+              </a:rPr>
               <a:t>Team device chip configuration not considered when choosing a database driver </a:t>
             </a:r>
           </a:p>
           <a:p>
             <a:r>
-              <a:rPr lang="en-US" sz="2000" dirty="0"/>
+              <a:rPr lang="en-US" sz="2000" dirty="0">
+                <a:solidFill>
+                  <a:schemeClr val="tx1"/>
+                </a:solidFill>
+              </a:rPr>
               <a:t>The MSSQL 2022 server version 17 not compatible with ARM 64 chips, Intel Specific.</a:t>
+            </a:r>
+          </a:p>
+          <a:p>
+            <a:r>
+              <a:rPr lang="en-US" sz="2000" dirty="0">
+                <a:solidFill>
+                  <a:schemeClr val="tx1"/>
+                </a:solidFill>
+              </a:rPr>
+              <a:t>VM to extensive to implement </a:t>
+            </a:r>
+          </a:p>
+          <a:p>
+            <a:r>
+              <a:rPr lang="en-US" sz="2000" dirty="0">
+                <a:solidFill>
+                  <a:schemeClr val="tx1"/>
+                </a:solidFill>
+              </a:rPr>
+              <a:t>Solution: MSSQL-Azure Edge v18</a:t>
             </a:r>
           </a:p>
           <a:p>
@@ -5286,10 +5433,400 @@
       </p:grpSpPr>
       <p:sp useBgFill="1">
         <p:nvSpPr>
-          <p:cNvPr id="8" name="Rectangle 7">
-            <a:extLst>
-              <a:ext uri="{FF2B5EF4-FFF2-40B4-BE49-F238E27FC236}">
-                <a16:creationId xmlns:a16="http://schemas.microsoft.com/office/drawing/2014/main" id="{A7895A40-19A4-42D6-9D30-DBC1E8002635}"/>
+          <p:cNvPr id="28" name="Rectangle 27">
+            <a:extLst>
+              <a:ext uri="{FF2B5EF4-FFF2-40B4-BE49-F238E27FC236}">
+                <a16:creationId xmlns:a16="http://schemas.microsoft.com/office/drawing/2014/main" id="{C1A1C5D3-C053-4EE9-BE1A-419B6E27CCAE}"/>
+              </a:ext>
+              <a:ext uri="{C183D7F6-B498-43B3-948B-1728B52AA6E4}">
+                <adec:decorative xmlns:adec="http://schemas.microsoft.com/office/drawing/2017/decorative" val="1"/>
+              </a:ext>
+            </a:extLst>
+          </p:cNvPr>
+          <p:cNvSpPr>
+            <a:spLocks noGrp="1" noRot="1" noChangeAspect="1" noMove="1" noResize="1" noEditPoints="1" noAdjustHandles="1" noChangeArrowheads="1" noChangeShapeType="1" noTextEdit="1"/>
+          </p:cNvSpPr>
+          <p:nvPr>
+            <p:extLst>
+              <p:ext uri="{386F3935-93C4-4BCD-93E2-E3B085C9AB24}">
+                <p16:designElem xmlns:p16="http://schemas.microsoft.com/office/powerpoint/2015/main" val="1"/>
+              </p:ext>
+            </p:extLst>
+          </p:nvPr>
+        </p:nvSpPr>
+        <p:spPr>
+          <a:xfrm>
+            <a:off x="0" y="0"/>
+            <a:ext cx="12192000" cy="6858000"/>
+          </a:xfrm>
+          <a:prstGeom prst="rect">
+            <a:avLst/>
+          </a:prstGeom>
+          <a:ln>
+            <a:noFill/>
+          </a:ln>
+        </p:spPr>
+        <p:style>
+          <a:lnRef idx="2">
+            <a:schemeClr val="accent1">
+              <a:shade val="50000"/>
+            </a:schemeClr>
+          </a:lnRef>
+          <a:fillRef idx="1">
+            <a:schemeClr val="accent1"/>
+          </a:fillRef>
+          <a:effectRef idx="0">
+            <a:schemeClr val="accent1"/>
+          </a:effectRef>
+          <a:fontRef idx="minor">
+            <a:schemeClr val="lt1"/>
+          </a:fontRef>
+        </p:style>
+        <p:txBody>
+          <a:bodyPr rtlCol="0" anchor="ctr"/>
+          <a:lstStyle/>
+          <a:p>
+            <a:pPr algn="ctr"/>
+            <a:endParaRPr lang="en-US"/>
+          </a:p>
+        </p:txBody>
+      </p:sp>
+      <p:sp useBgFill="1">
+        <p:nvSpPr>
+          <p:cNvPr id="30" name="Rectangle 29">
+            <a:extLst>
+              <a:ext uri="{FF2B5EF4-FFF2-40B4-BE49-F238E27FC236}">
+                <a16:creationId xmlns:a16="http://schemas.microsoft.com/office/drawing/2014/main" id="{A3473CF9-37EB-43E7-89EF-D2D1C53D1DAC}"/>
+              </a:ext>
+              <a:ext uri="{C183D7F6-B498-43B3-948B-1728B52AA6E4}">
+                <adec:decorative xmlns:adec="http://schemas.microsoft.com/office/drawing/2017/decorative" val="1"/>
+              </a:ext>
+            </a:extLst>
+          </p:cNvPr>
+          <p:cNvSpPr>
+            <a:spLocks noGrp="1" noRot="1" noChangeAspect="1" noMove="1" noResize="1" noEditPoints="1" noAdjustHandles="1" noChangeArrowheads="1" noChangeShapeType="1" noTextEdit="1"/>
+          </p:cNvSpPr>
+          <p:nvPr>
+            <p:extLst>
+              <p:ext uri="{386F3935-93C4-4BCD-93E2-E3B085C9AB24}">
+                <p16:designElem xmlns:p16="http://schemas.microsoft.com/office/powerpoint/2015/main" val="1"/>
+              </p:ext>
+            </p:extLst>
+          </p:nvPr>
+        </p:nvSpPr>
+        <p:spPr>
+          <a:xfrm>
+            <a:off x="1903615" y="221673"/>
+            <a:ext cx="8384770" cy="1332634"/>
+          </a:xfrm>
+          <a:prstGeom prst="rect">
+            <a:avLst/>
+          </a:prstGeom>
+          <a:ln w="12700">
+            <a:solidFill>
+              <a:srgbClr val="E1E1E1"/>
+            </a:solidFill>
+          </a:ln>
+          <a:effectLst>
+            <a:outerShdw blurRad="50800" dist="38100" dir="2700000" algn="tl" rotWithShape="0">
+              <a:schemeClr val="bg2">
+                <a:lumMod val="85000"/>
+                <a:alpha val="50000"/>
+              </a:schemeClr>
+            </a:outerShdw>
+          </a:effectLst>
+        </p:spPr>
+        <p:style>
+          <a:lnRef idx="2">
+            <a:schemeClr val="accent1">
+              <a:shade val="50000"/>
+            </a:schemeClr>
+          </a:lnRef>
+          <a:fillRef idx="1">
+            <a:schemeClr val="accent1"/>
+          </a:fillRef>
+          <a:effectRef idx="0">
+            <a:schemeClr val="accent1"/>
+          </a:effectRef>
+          <a:fontRef idx="minor">
+            <a:schemeClr val="lt1"/>
+          </a:fontRef>
+        </p:style>
+        <p:txBody>
+          <a:bodyPr rtlCol="0" anchor="ctr"/>
+          <a:lstStyle/>
+          <a:p>
+            <a:pPr marL="0" marR="0" lvl="0" indent="0" algn="ctr" defTabSz="914400" rtl="0" eaLnBrk="1" fontAlgn="auto" latinLnBrk="0" hangingPunct="1">
+              <a:lnSpc>
+                <a:spcPct val="100000"/>
+              </a:lnSpc>
+              <a:spcBef>
+                <a:spcPts val="0"/>
+              </a:spcBef>
+              <a:spcAft>
+                <a:spcPts val="0"/>
+              </a:spcAft>
+              <a:buClrTx/>
+              <a:buSzTx/>
+              <a:buFontTx/>
+              <a:buNone/>
+              <a:tabLst/>
+              <a:defRPr/>
+            </a:pPr>
+            <a:endParaRPr kumimoji="0" lang="en-US" sz="1800" b="0" i="0" u="none" strike="noStrike" kern="1200" cap="none" spc="0" normalizeH="0" baseline="0" noProof="0">
+              <a:ln>
+                <a:noFill/>
+              </a:ln>
+              <a:solidFill>
+                <a:prstClr val="white"/>
+              </a:solidFill>
+              <a:effectLst/>
+              <a:uLnTx/>
+              <a:uFillTx/>
+              <a:latin typeface="Calibri" panose="020F0502020204030204"/>
+              <a:ea typeface="+mn-ea"/>
+              <a:cs typeface="+mn-cs"/>
+            </a:endParaRPr>
+          </a:p>
+        </p:txBody>
+      </p:sp>
+      <p:sp>
+        <p:nvSpPr>
+          <p:cNvPr id="2" name="Title 1">
+            <a:extLst>
+              <a:ext uri="{FF2B5EF4-FFF2-40B4-BE49-F238E27FC236}">
+                <a16:creationId xmlns:a16="http://schemas.microsoft.com/office/drawing/2014/main" id="{7523CF74-09B7-84B3-F859-D7073DC1C80F}"/>
+              </a:ext>
+            </a:extLst>
+          </p:cNvPr>
+          <p:cNvSpPr>
+            <a:spLocks noGrp="1"/>
+          </p:cNvSpPr>
+          <p:nvPr>
+            <p:ph type="title"/>
+          </p:nvPr>
+        </p:nvSpPr>
+        <p:spPr>
+          <a:xfrm>
+            <a:off x="2103121" y="310343"/>
+            <a:ext cx="7985759" cy="868823"/>
+          </a:xfrm>
+        </p:spPr>
+        <p:txBody>
+          <a:bodyPr vert="horz" lIns="91440" tIns="45720" rIns="91440" bIns="45720" rtlCol="0" anchor="ctr">
+            <a:normAutofit/>
+          </a:bodyPr>
+          <a:lstStyle/>
+          <a:p>
+            <a:pPr algn="ctr"/>
+            <a:r>
+              <a:rPr lang="en-US" sz="4000" kern="1200">
+                <a:solidFill>
+                  <a:schemeClr val="tx1"/>
+                </a:solidFill>
+                <a:latin typeface="+mj-lt"/>
+                <a:ea typeface="+mj-ea"/>
+                <a:cs typeface="+mj-cs"/>
+              </a:rPr>
+              <a:t>Planning</a:t>
+            </a:r>
+          </a:p>
+        </p:txBody>
+      </p:sp>
+      <p:sp>
+        <p:nvSpPr>
+          <p:cNvPr id="32" name="Rectangle: Rounded Corners 31">
+            <a:extLst>
+              <a:ext uri="{FF2B5EF4-FFF2-40B4-BE49-F238E27FC236}">
+                <a16:creationId xmlns:a16="http://schemas.microsoft.com/office/drawing/2014/main" id="{586B4EF9-43BA-4655-A6FF-1D8E21574C95}"/>
+              </a:ext>
+              <a:ext uri="{C183D7F6-B498-43B3-948B-1728B52AA6E4}">
+                <adec:decorative xmlns:adec="http://schemas.microsoft.com/office/drawing/2017/decorative" val="1"/>
+              </a:ext>
+            </a:extLst>
+          </p:cNvPr>
+          <p:cNvSpPr>
+            <a:spLocks noGrp="1" noRot="1" noChangeAspect="1" noMove="1" noResize="1" noEditPoints="1" noAdjustHandles="1" noChangeArrowheads="1" noChangeShapeType="1" noTextEdit="1"/>
+          </p:cNvSpPr>
+          <p:nvPr>
+            <p:extLst>
+              <p:ext uri="{386F3935-93C4-4BCD-93E2-E3B085C9AB24}">
+                <p16:designElem xmlns:p16="http://schemas.microsoft.com/office/powerpoint/2015/main" val="1"/>
+              </p:ext>
+            </p:extLst>
+          </p:nvPr>
+        </p:nvSpPr>
+        <p:spPr>
+          <a:xfrm>
+            <a:off x="2483110" y="1211407"/>
+            <a:ext cx="7225780" cy="685800"/>
+          </a:xfrm>
+          <a:prstGeom prst="roundRect">
+            <a:avLst>
+              <a:gd name="adj" fmla="val 0"/>
+            </a:avLst>
+          </a:prstGeom>
+          <a:solidFill>
+            <a:schemeClr val="accent2"/>
+          </a:solidFill>
+          <a:ln>
+            <a:noFill/>
+          </a:ln>
+        </p:spPr>
+        <p:style>
+          <a:lnRef idx="2">
+            <a:schemeClr val="accent1">
+              <a:shade val="50000"/>
+            </a:schemeClr>
+          </a:lnRef>
+          <a:fillRef idx="1">
+            <a:schemeClr val="accent1"/>
+          </a:fillRef>
+          <a:effectRef idx="0">
+            <a:schemeClr val="accent1"/>
+          </a:effectRef>
+          <a:fontRef idx="minor">
+            <a:schemeClr val="lt1"/>
+          </a:fontRef>
+        </p:style>
+        <p:txBody>
+          <a:bodyPr rtlCol="0" anchor="ctr"/>
+          <a:lstStyle/>
+          <a:p>
+            <a:pPr algn="ctr"/>
+            <a:endParaRPr lang="en-US">
+              <a:solidFill>
+                <a:prstClr val="white"/>
+              </a:solidFill>
+              <a:latin typeface="Calibri" panose="020F0502020204030204"/>
+            </a:endParaRPr>
+          </a:p>
+        </p:txBody>
+      </p:sp>
+      <p:sp>
+        <p:nvSpPr>
+          <p:cNvPr id="3" name="Text Placeholder 2">
+            <a:extLst>
+              <a:ext uri="{FF2B5EF4-FFF2-40B4-BE49-F238E27FC236}">
+                <a16:creationId xmlns:a16="http://schemas.microsoft.com/office/drawing/2014/main" id="{C605E30C-3490-D1E3-740D-40AD5E393958}"/>
+              </a:ext>
+            </a:extLst>
+          </p:cNvPr>
+          <p:cNvSpPr>
+            <a:spLocks noGrp="1"/>
+          </p:cNvSpPr>
+          <p:nvPr>
+            <p:ph type="body" idx="1"/>
+          </p:nvPr>
+        </p:nvSpPr>
+        <p:spPr>
+          <a:xfrm>
+            <a:off x="2615738" y="1263807"/>
+            <a:ext cx="6960524" cy="598516"/>
+          </a:xfrm>
+        </p:spPr>
+        <p:txBody>
+          <a:bodyPr vert="horz" lIns="91440" tIns="45720" rIns="91440" bIns="45720" rtlCol="0" anchor="ctr">
+            <a:normAutofit/>
+          </a:bodyPr>
+          <a:lstStyle/>
+          <a:p>
+            <a:pPr algn="ctr"/>
+            <a:r>
+              <a:rPr lang="en-US" sz="2000" kern="1200">
+                <a:solidFill>
+                  <a:schemeClr val="bg1"/>
+                </a:solidFill>
+                <a:latin typeface="+mn-lt"/>
+                <a:ea typeface="+mn-ea"/>
+                <a:cs typeface="+mn-cs"/>
+              </a:rPr>
+              <a:t>Gant chart</a:t>
+            </a:r>
+          </a:p>
+        </p:txBody>
+      </p:sp>
+      <p:pic>
+        <p:nvPicPr>
+          <p:cNvPr id="5" name="Picture 4">
+            <a:extLst>
+              <a:ext uri="{FF2B5EF4-FFF2-40B4-BE49-F238E27FC236}">
+                <a16:creationId xmlns:a16="http://schemas.microsoft.com/office/drawing/2014/main" id="{62C793AA-0814-47BD-AB3D-851D9ACB6DC1}"/>
+              </a:ext>
+            </a:extLst>
+          </p:cNvPr>
+          <p:cNvPicPr>
+            <a:picLocks noChangeAspect="1"/>
+          </p:cNvPicPr>
+          <p:nvPr/>
+        </p:nvPicPr>
+        <p:blipFill>
+          <a:blip r:embed="rId2">
+            <a:extLst>
+              <a:ext uri="{28A0092B-C50C-407E-A947-70E740481C1C}">
+                <a14:useLocalDpi xmlns:a14="http://schemas.microsoft.com/office/drawing/2010/main" val="0"/>
+              </a:ext>
+            </a:extLst>
+          </a:blip>
+          <a:stretch>
+            <a:fillRect/>
+          </a:stretch>
+        </p:blipFill>
+        <p:spPr bwMode="auto">
+          <a:xfrm>
+            <a:off x="560173" y="1986447"/>
+            <a:ext cx="11485265" cy="4249549"/>
+          </a:xfrm>
+          <a:prstGeom prst="rect">
+            <a:avLst/>
+          </a:prstGeom>
+          <a:noFill/>
+        </p:spPr>
+      </p:pic>
+    </p:spTree>
+    <p:extLst>
+      <p:ext uri="{BB962C8B-B14F-4D97-AF65-F5344CB8AC3E}">
+        <p14:creationId xmlns:p14="http://schemas.microsoft.com/office/powerpoint/2010/main" val="3713997872"/>
+      </p:ext>
+    </p:extLst>
+  </p:cSld>
+  <p:clrMapOvr>
+    <a:masterClrMapping/>
+  </p:clrMapOvr>
+</p:sld>
+</file>
+
+<file path=ppt/slides/slide5.xml><?xml version="1.0" encoding="utf-8"?>
+<p:sld xmlns:a="http://schemas.openxmlformats.org/drawingml/2006/main" xmlns:r="http://schemas.openxmlformats.org/officeDocument/2006/relationships" xmlns:p="http://schemas.openxmlformats.org/presentationml/2006/main">
+  <p:cSld>
+    <p:bg>
+      <p:bgPr>
+        <a:solidFill>
+          <a:schemeClr val="bg1"/>
+        </a:solidFill>
+        <a:effectLst/>
+      </p:bgPr>
+    </p:bg>
+    <p:spTree>
+      <p:nvGrpSpPr>
+        <p:cNvPr id="1" name=""/>
+        <p:cNvGrpSpPr/>
+        <p:nvPr/>
+      </p:nvGrpSpPr>
+      <p:grpSpPr>
+        <a:xfrm>
+          <a:off x="0" y="0"/>
+          <a:ext cx="0" cy="0"/>
+          <a:chOff x="0" y="0"/>
+          <a:chExt cx="0" cy="0"/>
+        </a:xfrm>
+      </p:grpSpPr>
+      <p:sp useBgFill="1">
+        <p:nvSpPr>
+          <p:cNvPr id="7" name="Rectangle 6">
+            <a:extLst>
+              <a:ext uri="{FF2B5EF4-FFF2-40B4-BE49-F238E27FC236}">
+                <a16:creationId xmlns:a16="http://schemas.microsoft.com/office/drawing/2014/main" id="{9C7E0A2C-7C0A-4AAC-B3B0-6C12B2EBAE05}"/>
               </a:ext>
               <a:ext uri="{C183D7F6-B498-43B3-948B-1728B52AA6E4}">
                 <adec:decorative xmlns:adec="http://schemas.microsoft.com/office/drawing/2017/decorative" val="1"/>
@@ -5346,10 +5883,10 @@
       </p:sp>
       <p:sp>
         <p:nvSpPr>
-          <p:cNvPr id="10" name="Rectangle 9">
-            <a:extLst>
-              <a:ext uri="{FF2B5EF4-FFF2-40B4-BE49-F238E27FC236}">
-                <a16:creationId xmlns:a16="http://schemas.microsoft.com/office/drawing/2014/main" id="{02F429C4-ABC9-46FC-818A-B5429CDE4A96}"/>
+          <p:cNvPr id="9" name="Rectangle 8">
+            <a:extLst>
+              <a:ext uri="{FF2B5EF4-FFF2-40B4-BE49-F238E27FC236}">
+                <a16:creationId xmlns:a16="http://schemas.microsoft.com/office/drawing/2014/main" id="{5EB7D2A2-F448-44D4-938C-DC84CBCB3B1E}"/>
               </a:ext>
               <a:ext uri="{C183D7F6-B498-43B3-948B-1728B52AA6E4}">
                 <adec:decorative xmlns:adec="http://schemas.microsoft.com/office/drawing/2017/decorative" val="1"/>
@@ -5368,9 +5905,9 @@
           </p:nvPr>
         </p:nvSpPr>
         <p:spPr>
-          <a:xfrm rot="5400000">
-            <a:off x="-1270325" y="3369273"/>
-            <a:ext cx="3200400" cy="152382"/>
+          <a:xfrm>
+            <a:off x="0" y="1"/>
+            <a:ext cx="12192000" cy="5187142"/>
           </a:xfrm>
           <a:prstGeom prst="rect">
             <a:avLst/>
@@ -5403,16 +5940,16 @@
           <a:lstStyle/>
           <a:p>
             <a:pPr algn="ctr"/>
-            <a:endParaRPr lang="en-US"/>
-          </a:p>
-        </p:txBody>
-      </p:sp>
-      <p:sp>
-        <p:nvSpPr>
-          <p:cNvPr id="12" name="Rectangle 11">
-            <a:extLst>
-              <a:ext uri="{FF2B5EF4-FFF2-40B4-BE49-F238E27FC236}">
-                <a16:creationId xmlns:a16="http://schemas.microsoft.com/office/drawing/2014/main" id="{2CEF98E4-3709-4952-8F42-2305CCE34FA3}"/>
+            <a:endParaRPr lang="en-US" dirty="0"/>
+          </a:p>
+        </p:txBody>
+      </p:sp>
+      <p:sp>
+        <p:nvSpPr>
+          <p:cNvPr id="11" name="Rectangle 10">
+            <a:extLst>
+              <a:ext uri="{FF2B5EF4-FFF2-40B4-BE49-F238E27FC236}">
+                <a16:creationId xmlns:a16="http://schemas.microsoft.com/office/drawing/2014/main" id="{871AEA07-1E14-44B4-8E55-64EF049CD66F}"/>
               </a:ext>
               <a:ext uri="{C183D7F6-B498-43B3-948B-1728B52AA6E4}">
                 <adec:decorative xmlns:adec="http://schemas.microsoft.com/office/drawing/2017/decorative" val="1"/>
@@ -5431,72 +5968,9 @@
           </p:nvPr>
         </p:nvSpPr>
         <p:spPr>
-          <a:xfrm rot="16200000">
-            <a:off x="6374475" y="1040470"/>
-            <a:ext cx="6858003" cy="4777047"/>
-          </a:xfrm>
-          <a:prstGeom prst="rect">
-            <a:avLst/>
-          </a:prstGeom>
-          <a:solidFill>
-            <a:schemeClr val="accent4"/>
-          </a:solidFill>
-          <a:ln>
-            <a:noFill/>
-          </a:ln>
-        </p:spPr>
-        <p:style>
-          <a:lnRef idx="2">
-            <a:schemeClr val="accent1">
-              <a:shade val="50000"/>
-            </a:schemeClr>
-          </a:lnRef>
-          <a:fillRef idx="1">
-            <a:schemeClr val="accent1"/>
-          </a:fillRef>
-          <a:effectRef idx="0">
-            <a:schemeClr val="accent1"/>
-          </a:effectRef>
-          <a:fontRef idx="minor">
-            <a:schemeClr val="lt1"/>
-          </a:fontRef>
-        </p:style>
-        <p:txBody>
-          <a:bodyPr rtlCol="0" anchor="ctr"/>
-          <a:lstStyle/>
-          <a:p>
-            <a:pPr algn="ctr"/>
-            <a:endParaRPr lang="en-US" dirty="0"/>
-          </a:p>
-        </p:txBody>
-      </p:sp>
-      <p:sp>
-        <p:nvSpPr>
-          <p:cNvPr id="14" name="Rectangle 13">
-            <a:extLst>
-              <a:ext uri="{FF2B5EF4-FFF2-40B4-BE49-F238E27FC236}">
-                <a16:creationId xmlns:a16="http://schemas.microsoft.com/office/drawing/2014/main" id="{F10BCCF5-D685-47FF-B675-647EAEB72C8E}"/>
-              </a:ext>
-              <a:ext uri="{C183D7F6-B498-43B3-948B-1728B52AA6E4}">
-                <adec:decorative xmlns:adec="http://schemas.microsoft.com/office/drawing/2017/decorative" val="1"/>
-              </a:ext>
-            </a:extLst>
-          </p:cNvPr>
-          <p:cNvSpPr>
-            <a:spLocks noGrp="1" noRot="1" noChangeAspect="1" noMove="1" noResize="1" noEditPoints="1" noAdjustHandles="1" noChangeArrowheads="1" noChangeShapeType="1" noTextEdit="1"/>
-          </p:cNvSpPr>
-          <p:nvPr>
-            <p:extLst>
-              <p:ext uri="{386F3935-93C4-4BCD-93E2-E3B085C9AB24}">
-                <p16:designElem xmlns:p16="http://schemas.microsoft.com/office/powerpoint/2015/main" val="1"/>
-              </p:ext>
-            </p:extLst>
-          </p:nvPr>
-        </p:nvSpPr>
-        <p:spPr>
           <a:xfrm>
-            <a:off x="387914" y="857786"/>
-            <a:ext cx="11067024" cy="5208932"/>
+            <a:off x="596464" y="551961"/>
+            <a:ext cx="10999072" cy="5399950"/>
           </a:xfrm>
           <a:prstGeom prst="rect">
             <a:avLst/>
@@ -5545,7 +6019,7 @@
           <p:cNvPr id="2" name="Title 1">
             <a:extLst>
               <a:ext uri="{FF2B5EF4-FFF2-40B4-BE49-F238E27FC236}">
-                <a16:creationId xmlns:a16="http://schemas.microsoft.com/office/drawing/2014/main" id="{7523CF74-09B7-84B3-F859-D7073DC1C80F}"/>
+                <a16:creationId xmlns:a16="http://schemas.microsoft.com/office/drawing/2014/main" id="{9C9AD6B9-1CEE-7976-0BB7-22F5E9535735}"/>
               </a:ext>
             </a:extLst>
           </p:cNvPr>
@@ -5558,18 +6032,19 @@
         </p:nvSpPr>
         <p:spPr>
           <a:xfrm>
-            <a:off x="966278" y="1189117"/>
-            <a:ext cx="3730009" cy="1136833"/>
+            <a:off x="1523999" y="1180494"/>
+            <a:ext cx="9144000" cy="2387600"/>
           </a:xfrm>
         </p:spPr>
         <p:txBody>
-          <a:bodyPr vert="horz" lIns="91440" tIns="45720" rIns="91440" bIns="45720" rtlCol="0" anchor="t">
-            <a:normAutofit fontScale="90000"/>
+          <a:bodyPr vert="horz" lIns="91440" tIns="45720" rIns="91440" bIns="45720" rtlCol="0" anchor="b">
+            <a:normAutofit/>
           </a:bodyPr>
           <a:lstStyle/>
           <a:p>
-            <a:r>
-              <a:rPr lang="en-US" sz="8000" kern="1200" dirty="0">
+            <a:pPr algn="ctr"/>
+            <a:r>
+              <a:rPr lang="en-US" sz="3500" kern="1200" dirty="0">
                 <a:solidFill>
                   <a:schemeClr val="tx1"/>
                 </a:solidFill>
@@ -5577,81 +6052,52 @@
                 <a:ea typeface="+mj-ea"/>
                 <a:cs typeface="+mj-cs"/>
               </a:rPr>
-              <a:t>Planning</a:t>
-            </a:r>
-          </a:p>
-        </p:txBody>
-      </p:sp>
-      <p:sp>
-        <p:nvSpPr>
-          <p:cNvPr id="3" name="Text Placeholder 2">
-            <a:extLst>
-              <a:ext uri="{FF2B5EF4-FFF2-40B4-BE49-F238E27FC236}">
-                <a16:creationId xmlns:a16="http://schemas.microsoft.com/office/drawing/2014/main" id="{C605E30C-3490-D1E3-740D-40AD5E393958}"/>
-              </a:ext>
-            </a:extLst>
-          </p:cNvPr>
-          <p:cNvSpPr>
-            <a:spLocks noGrp="1"/>
-          </p:cNvSpPr>
-          <p:nvPr>
-            <p:ph type="body" idx="1"/>
-          </p:nvPr>
-        </p:nvSpPr>
-        <p:spPr>
-          <a:xfrm>
-            <a:off x="831000" y="2821385"/>
-            <a:ext cx="9910295" cy="1281733"/>
-          </a:xfrm>
-        </p:spPr>
-        <p:txBody>
-          <a:bodyPr vert="horz" lIns="91440" tIns="45720" rIns="91440" bIns="45720" rtlCol="0" anchor="b">
-            <a:normAutofit/>
-          </a:bodyPr>
-          <a:lstStyle/>
-          <a:p>
-            <a:r>
-              <a:rPr lang="en-US" kern="1200" dirty="0">
+              <a:t>Website: </a:t>
+            </a:r>
+            <a:r>
+              <a:rPr lang="en-US" sz="3500" kern="1200" dirty="0">
                 <a:solidFill>
-                  <a:schemeClr val="tx1"/>
+                  <a:srgbClr val="0070C0"/>
                 </a:solidFill>
-                <a:latin typeface="+mn-lt"/>
-                <a:ea typeface="+mn-ea"/>
-                <a:cs typeface="+mn-cs"/>
+                <a:latin typeface="+mj-lt"/>
+                <a:ea typeface="+mj-ea"/>
+                <a:cs typeface="+mj-cs"/>
+                <a:hlinkClick r:id="rId2">
+                  <a:extLst>
+                    <a:ext uri="{A12FA001-AC4F-418D-AE19-62706E023703}">
+                      <ahyp:hlinkClr xmlns:ahyp="http://schemas.microsoft.com/office/drawing/2018/hyperlinkcolor" val="tx"/>
+                    </a:ext>
+                  </a:extLst>
+                </a:hlinkClick>
               </a:rPr>
-              <a:t>Gant chart</a:t>
-            </a:r>
-          </a:p>
-          <a:p>
-            <a:r>
-              <a:rPr lang="en-US" kern="1200" dirty="0">
-                <a:solidFill>
-                  <a:schemeClr val="tx1"/>
-                </a:solidFill>
-                <a:latin typeface="+mn-lt"/>
-                <a:ea typeface="+mn-ea"/>
-                <a:cs typeface="+mn-cs"/>
-              </a:rPr>
-              <a:t>Website</a:t>
-            </a:r>
-          </a:p>
-        </p:txBody>
-      </p:sp>
-      <p:sp>
-        <p:nvSpPr>
-          <p:cNvPr id="16" name="Rectangle 15">
-            <a:extLst>
-              <a:ext uri="{FF2B5EF4-FFF2-40B4-BE49-F238E27FC236}">
-                <a16:creationId xmlns:a16="http://schemas.microsoft.com/office/drawing/2014/main" id="{B0EE8A42-107A-4D4C-8D56-BBAE95C7FC0D}"/>
+              <a:t>https://jjdeuce06.github.io/VulcanActivityTracker/</a:t>
+            </a:r>
+            <a:endParaRPr lang="en-US" sz="3500" kern="1200" dirty="0">
+              <a:solidFill>
+                <a:srgbClr val="0070C0"/>
+              </a:solidFill>
+              <a:latin typeface="+mj-lt"/>
+              <a:ea typeface="+mj-ea"/>
+              <a:cs typeface="+mj-cs"/>
+            </a:endParaRPr>
+          </a:p>
+        </p:txBody>
+      </p:sp>
+      <p:cxnSp>
+        <p:nvCxnSpPr>
+          <p:cNvPr id="13" name="Straight Connector 12">
+            <a:extLst>
+              <a:ext uri="{FF2B5EF4-FFF2-40B4-BE49-F238E27FC236}">
+                <a16:creationId xmlns:a16="http://schemas.microsoft.com/office/drawing/2014/main" id="{F7C8EA93-3210-4C62-99E9-153C275E3A87}"/>
               </a:ext>
               <a:ext uri="{C183D7F6-B498-43B3-948B-1728B52AA6E4}">
                 <adec:decorative xmlns:adec="http://schemas.microsoft.com/office/drawing/2017/decorative" val="1"/>
               </a:ext>
             </a:extLst>
           </p:cNvPr>
-          <p:cNvSpPr>
-            <a:spLocks noGrp="1" noRot="1" noChangeAspect="1" noMove="1" noResize="1" noEditPoints="1" noAdjustHandles="1" noChangeArrowheads="1" noChangeShapeType="1" noTextEdit="1"/>
-          </p:cNvSpPr>
+          <p:cNvCxnSpPr>
+            <a:cxnSpLocks noGrp="1" noRot="1" noChangeAspect="1" noMove="1" noResize="1" noEditPoints="1" noAdjustHandles="1" noChangeArrowheads="1" noChangeShapeType="1"/>
+          </p:cNvCxnSpPr>
           <p:nvPr>
             <p:extLst>
               <p:ext uri="{386F3935-93C4-4BCD-93E2-E3B085C9AB24}">
@@ -5659,51 +6105,40 @@
               </p:ext>
             </p:extLst>
           </p:nvPr>
-        </p:nvSpPr>
+        </p:nvCxnSpPr>
         <p:spPr>
-          <a:xfrm rot="5400000">
-            <a:off x="-1524009" y="3366125"/>
-            <a:ext cx="3200400" cy="152382"/>
+          <a:xfrm flipH="1">
+            <a:off x="596464" y="6329769"/>
+            <a:ext cx="11000232" cy="0"/>
           </a:xfrm>
-          <a:prstGeom prst="rect">
+          <a:prstGeom prst="line">
             <a:avLst/>
           </a:prstGeom>
-          <a:solidFill>
-            <a:schemeClr val="accent4"/>
-          </a:solidFill>
-          <a:ln>
-            <a:noFill/>
+          <a:ln w="152400">
+            <a:solidFill>
+              <a:schemeClr val="accent4"/>
+            </a:solidFill>
           </a:ln>
         </p:spPr>
         <p:style>
-          <a:lnRef idx="2">
-            <a:schemeClr val="accent1">
-              <a:shade val="50000"/>
-            </a:schemeClr>
+          <a:lnRef idx="1">
+            <a:schemeClr val="accent1"/>
           </a:lnRef>
-          <a:fillRef idx="1">
+          <a:fillRef idx="0">
             <a:schemeClr val="accent1"/>
           </a:fillRef>
           <a:effectRef idx="0">
             <a:schemeClr val="accent1"/>
           </a:effectRef>
           <a:fontRef idx="minor">
-            <a:schemeClr val="lt1"/>
+            <a:schemeClr val="tx1"/>
           </a:fontRef>
         </p:style>
-        <p:txBody>
-          <a:bodyPr rtlCol="0" anchor="ctr"/>
-          <a:lstStyle/>
-          <a:p>
-            <a:pPr algn="ctr"/>
-            <a:endParaRPr lang="en-US"/>
-          </a:p>
-        </p:txBody>
-      </p:sp>
+      </p:cxnSp>
     </p:spTree>
     <p:extLst>
       <p:ext uri="{BB962C8B-B14F-4D97-AF65-F5344CB8AC3E}">
-        <p14:creationId xmlns:p14="http://schemas.microsoft.com/office/powerpoint/2010/main" val="3713997872"/>
+        <p14:creationId xmlns:p14="http://schemas.microsoft.com/office/powerpoint/2010/main" val="3921983173"/>
       </p:ext>
     </p:extLst>
   </p:cSld>

</xml_diff>

<commit_message>
Added an updated gantt chart to slides and doc
</commit_message>
<xml_diff>
--- a/Documentation/Weekly Report/week2/CMSC-4920-Group2-Week2.pptx
+++ b/Documentation/Weekly Report/week2/CMSC-4920-Group2-Week2.pptx
@@ -727,6 +727,38 @@
             <ac:cxnSpMk id="13" creationId="{F7C8EA93-3210-4C62-99E9-153C275E3A87}"/>
           </ac:cxnSpMkLst>
         </pc:cxnChg>
+      </pc:sldChg>
+    </pc:docChg>
+  </pc:docChgLst>
+  <pc:docChgLst>
+    <pc:chgData name="Luke ruffing" userId="c83d55373a9d0f60" providerId="LiveId" clId="{7F051426-1AF3-4D06-899D-16659997B519}"/>
+    <pc:docChg chg="custSel modSld">
+      <pc:chgData name="Luke ruffing" userId="c83d55373a9d0f60" providerId="LiveId" clId="{7F051426-1AF3-4D06-899D-16659997B519}" dt="2026-01-23T15:36:28.388" v="3" actId="1076"/>
+      <pc:docMkLst>
+        <pc:docMk/>
+      </pc:docMkLst>
+      <pc:sldChg chg="addSp delSp modSp mod">
+        <pc:chgData name="Luke ruffing" userId="c83d55373a9d0f60" providerId="LiveId" clId="{7F051426-1AF3-4D06-899D-16659997B519}" dt="2026-01-23T15:36:28.388" v="3" actId="1076"/>
+        <pc:sldMkLst>
+          <pc:docMk/>
+          <pc:sldMk cId="3713997872" sldId="259"/>
+        </pc:sldMkLst>
+        <pc:picChg chg="del">
+          <ac:chgData name="Luke ruffing" userId="c83d55373a9d0f60" providerId="LiveId" clId="{7F051426-1AF3-4D06-899D-16659997B519}" dt="2026-01-23T15:36:11.535" v="0" actId="478"/>
+          <ac:picMkLst>
+            <pc:docMk/>
+            <pc:sldMk cId="3713997872" sldId="259"/>
+            <ac:picMk id="5" creationId="{62C793AA-0814-47BD-AB3D-851D9ACB6DC1}"/>
+          </ac:picMkLst>
+        </pc:picChg>
+        <pc:picChg chg="add mod">
+          <ac:chgData name="Luke ruffing" userId="c83d55373a9d0f60" providerId="LiveId" clId="{7F051426-1AF3-4D06-899D-16659997B519}" dt="2026-01-23T15:36:28.388" v="3" actId="1076"/>
+          <ac:picMkLst>
+            <pc:docMk/>
+            <pc:sldMk cId="3713997872" sldId="259"/>
+            <ac:picMk id="6" creationId="{C1CF0394-4A20-0FB1-F6CC-606ADAD6FC83}"/>
+          </ac:picMkLst>
+        </pc:picChg>
       </pc:sldChg>
     </pc:docChg>
   </pc:docChgLst>
@@ -5748,10 +5780,10 @@
       </p:sp>
       <p:pic>
         <p:nvPicPr>
-          <p:cNvPr id="5" name="Picture 4">
-            <a:extLst>
-              <a:ext uri="{FF2B5EF4-FFF2-40B4-BE49-F238E27FC236}">
-                <a16:creationId xmlns:a16="http://schemas.microsoft.com/office/drawing/2014/main" id="{62C793AA-0814-47BD-AB3D-851D9ACB6DC1}"/>
+          <p:cNvPr id="6" name="Picture 5">
+            <a:extLst>
+              <a:ext uri="{FF2B5EF4-FFF2-40B4-BE49-F238E27FC236}">
+                <a16:creationId xmlns:a16="http://schemas.microsoft.com/office/drawing/2014/main" id="{C1CF0394-4A20-0FB1-F6CC-606ADAD6FC83}"/>
               </a:ext>
             </a:extLst>
           </p:cNvPr>
@@ -5761,26 +5793,19 @@
           <p:nvPr/>
         </p:nvPicPr>
         <p:blipFill>
-          <a:blip r:embed="rId2">
-            <a:extLst>
-              <a:ext uri="{28A0092B-C50C-407E-A947-70E740481C1C}">
-                <a14:useLocalDpi xmlns:a14="http://schemas.microsoft.com/office/drawing/2010/main" val="0"/>
-              </a:ext>
-            </a:extLst>
-          </a:blip>
+          <a:blip r:embed="rId2"/>
           <a:stretch>
             <a:fillRect/>
           </a:stretch>
         </p:blipFill>
-        <p:spPr bwMode="auto">
+        <p:spPr>
           <a:xfrm>
-            <a:off x="560173" y="1986447"/>
-            <a:ext cx="11485265" cy="4249549"/>
+            <a:off x="275111" y="2168842"/>
+            <a:ext cx="11641777" cy="4074622"/>
           </a:xfrm>
           <a:prstGeom prst="rect">
             <a:avLst/>
           </a:prstGeom>
-          <a:noFill/>
         </p:spPr>
       </p:pic>
     </p:spTree>

</xml_diff>